<commit_message>
final analysis ready for submission
</commit_message>
<xml_diff>
--- a/unsupervised/ibm_capstone/culture_center_battle/pics/culture.pptx
+++ b/unsupervised/ibm_capstone/culture_center_battle/pics/culture.pptx
@@ -4,11 +4,16 @@
   <p:sldMasterIdLst>
     <p:sldMasterId id="2147483648" r:id="rId1"/>
   </p:sldMasterIdLst>
+  <p:notesMasterIdLst>
+    <p:notesMasterId r:id="rId8"/>
+  </p:notesMasterIdLst>
   <p:sldIdLst>
     <p:sldId id="256" r:id="rId2"/>
     <p:sldId id="257" r:id="rId3"/>
     <p:sldId id="259" r:id="rId4"/>
     <p:sldId id="258" r:id="rId5"/>
+    <p:sldId id="260" r:id="rId6"/>
+    <p:sldId id="261" r:id="rId7"/>
   </p:sldIdLst>
   <p:sldSz cx="12192000" cy="6858000"/>
   <p:notesSz cx="6858000" cy="9144000"/>
@@ -113,6 +118,440 @@
     </p:ext>
   </p:extLst>
 </p:presentation>
+</file>
+
+<file path=ppt/notesMasters/notesMaster1.xml><?xml version="1.0" encoding="utf-8"?>
+<p:notesMaster xmlns:a="http://schemas.openxmlformats.org/drawingml/2006/main" xmlns:r="http://schemas.openxmlformats.org/officeDocument/2006/relationships" xmlns:p="http://schemas.openxmlformats.org/presentationml/2006/main">
+  <p:cSld>
+    <p:bg>
+      <p:bgRef idx="1001">
+        <a:schemeClr val="bg1"/>
+      </p:bgRef>
+    </p:bg>
+    <p:spTree>
+      <p:nvGrpSpPr>
+        <p:cNvPr id="1" name=""/>
+        <p:cNvGrpSpPr/>
+        <p:nvPr/>
+      </p:nvGrpSpPr>
+      <p:grpSpPr>
+        <a:xfrm>
+          <a:off x="0" y="0"/>
+          <a:ext cx="0" cy="0"/>
+          <a:chOff x="0" y="0"/>
+          <a:chExt cx="0" cy="0"/>
+        </a:xfrm>
+      </p:grpSpPr>
+      <p:sp>
+        <p:nvSpPr>
+          <p:cNvPr id="2" name="Header Placeholder 1"/>
+          <p:cNvSpPr>
+            <a:spLocks noGrp="1"/>
+          </p:cNvSpPr>
+          <p:nvPr>
+            <p:ph type="hdr" sz="quarter"/>
+          </p:nvPr>
+        </p:nvSpPr>
+        <p:spPr>
+          <a:xfrm>
+            <a:off x="0" y="0"/>
+            <a:ext cx="2971800" cy="458788"/>
+          </a:xfrm>
+          <a:prstGeom prst="rect">
+            <a:avLst/>
+          </a:prstGeom>
+        </p:spPr>
+        <p:txBody>
+          <a:bodyPr vert="horz" lIns="91440" tIns="45720" rIns="91440" bIns="45720" rtlCol="0"/>
+          <a:lstStyle>
+            <a:lvl1pPr algn="l">
+              <a:defRPr sz="1200"/>
+            </a:lvl1pPr>
+          </a:lstStyle>
+          <a:p>
+            <a:endParaRPr lang="en-IN"/>
+          </a:p>
+        </p:txBody>
+      </p:sp>
+      <p:sp>
+        <p:nvSpPr>
+          <p:cNvPr id="3" name="Date Placeholder 2"/>
+          <p:cNvSpPr>
+            <a:spLocks noGrp="1"/>
+          </p:cNvSpPr>
+          <p:nvPr>
+            <p:ph type="dt" idx="1"/>
+          </p:nvPr>
+        </p:nvSpPr>
+        <p:spPr>
+          <a:xfrm>
+            <a:off x="3884613" y="0"/>
+            <a:ext cx="2971800" cy="458788"/>
+          </a:xfrm>
+          <a:prstGeom prst="rect">
+            <a:avLst/>
+          </a:prstGeom>
+        </p:spPr>
+        <p:txBody>
+          <a:bodyPr vert="horz" lIns="91440" tIns="45720" rIns="91440" bIns="45720" rtlCol="0"/>
+          <a:lstStyle>
+            <a:lvl1pPr algn="r">
+              <a:defRPr sz="1200"/>
+            </a:lvl1pPr>
+          </a:lstStyle>
+          <a:p>
+            <a:fld id="{20FE9D26-456E-4F03-A31E-EC7DE36D81B8}" type="datetimeFigureOut">
+              <a:rPr lang="en-IN" smtClean="0"/>
+              <a:t>23-02-2019</a:t>
+            </a:fld>
+            <a:endParaRPr lang="en-IN"/>
+          </a:p>
+        </p:txBody>
+      </p:sp>
+      <p:sp>
+        <p:nvSpPr>
+          <p:cNvPr id="4" name="Slide Image Placeholder 3"/>
+          <p:cNvSpPr>
+            <a:spLocks noGrp="1" noRot="1" noChangeAspect="1"/>
+          </p:cNvSpPr>
+          <p:nvPr>
+            <p:ph type="sldImg" idx="2"/>
+          </p:nvPr>
+        </p:nvSpPr>
+        <p:spPr>
+          <a:xfrm>
+            <a:off x="685800" y="1143000"/>
+            <a:ext cx="5486400" cy="3086100"/>
+          </a:xfrm>
+          <a:prstGeom prst="rect">
+            <a:avLst/>
+          </a:prstGeom>
+          <a:noFill/>
+          <a:ln w="12700">
+            <a:solidFill>
+              <a:prstClr val="black"/>
+            </a:solidFill>
+          </a:ln>
+        </p:spPr>
+        <p:txBody>
+          <a:bodyPr vert="horz" lIns="91440" tIns="45720" rIns="91440" bIns="45720" rtlCol="0" anchor="ctr"/>
+          <a:lstStyle/>
+          <a:p>
+            <a:endParaRPr lang="en-IN"/>
+          </a:p>
+        </p:txBody>
+      </p:sp>
+      <p:sp>
+        <p:nvSpPr>
+          <p:cNvPr id="5" name="Notes Placeholder 4"/>
+          <p:cNvSpPr>
+            <a:spLocks noGrp="1"/>
+          </p:cNvSpPr>
+          <p:nvPr>
+            <p:ph type="body" sz="quarter" idx="3"/>
+          </p:nvPr>
+        </p:nvSpPr>
+        <p:spPr>
+          <a:xfrm>
+            <a:off x="685800" y="4400550"/>
+            <a:ext cx="5486400" cy="3600450"/>
+          </a:xfrm>
+          <a:prstGeom prst="rect">
+            <a:avLst/>
+          </a:prstGeom>
+        </p:spPr>
+        <p:txBody>
+          <a:bodyPr vert="horz" lIns="91440" tIns="45720" rIns="91440" bIns="45720" rtlCol="0"/>
+          <a:lstStyle/>
+          <a:p>
+            <a:pPr lvl="0"/>
+            <a:r>
+              <a:rPr lang="en-US"/>
+              <a:t>Edit Master text styles</a:t>
+            </a:r>
+          </a:p>
+          <a:p>
+            <a:pPr lvl="1"/>
+            <a:r>
+              <a:rPr lang="en-US"/>
+              <a:t>Second level</a:t>
+            </a:r>
+          </a:p>
+          <a:p>
+            <a:pPr lvl="2"/>
+            <a:r>
+              <a:rPr lang="en-US"/>
+              <a:t>Third level</a:t>
+            </a:r>
+          </a:p>
+          <a:p>
+            <a:pPr lvl="3"/>
+            <a:r>
+              <a:rPr lang="en-US"/>
+              <a:t>Fourth level</a:t>
+            </a:r>
+          </a:p>
+          <a:p>
+            <a:pPr lvl="4"/>
+            <a:r>
+              <a:rPr lang="en-US"/>
+              <a:t>Fifth level</a:t>
+            </a:r>
+            <a:endParaRPr lang="en-IN"/>
+          </a:p>
+        </p:txBody>
+      </p:sp>
+      <p:sp>
+        <p:nvSpPr>
+          <p:cNvPr id="6" name="Footer Placeholder 5"/>
+          <p:cNvSpPr>
+            <a:spLocks noGrp="1"/>
+          </p:cNvSpPr>
+          <p:nvPr>
+            <p:ph type="ftr" sz="quarter" idx="4"/>
+          </p:nvPr>
+        </p:nvSpPr>
+        <p:spPr>
+          <a:xfrm>
+            <a:off x="0" y="8685213"/>
+            <a:ext cx="2971800" cy="458787"/>
+          </a:xfrm>
+          <a:prstGeom prst="rect">
+            <a:avLst/>
+          </a:prstGeom>
+        </p:spPr>
+        <p:txBody>
+          <a:bodyPr vert="horz" lIns="91440" tIns="45720" rIns="91440" bIns="45720" rtlCol="0" anchor="b"/>
+          <a:lstStyle>
+            <a:lvl1pPr algn="l">
+              <a:defRPr sz="1200"/>
+            </a:lvl1pPr>
+          </a:lstStyle>
+          <a:p>
+            <a:endParaRPr lang="en-IN"/>
+          </a:p>
+        </p:txBody>
+      </p:sp>
+      <p:sp>
+        <p:nvSpPr>
+          <p:cNvPr id="7" name="Slide Number Placeholder 6"/>
+          <p:cNvSpPr>
+            <a:spLocks noGrp="1"/>
+          </p:cNvSpPr>
+          <p:nvPr>
+            <p:ph type="sldNum" sz="quarter" idx="5"/>
+          </p:nvPr>
+        </p:nvSpPr>
+        <p:spPr>
+          <a:xfrm>
+            <a:off x="3884613" y="8685213"/>
+            <a:ext cx="2971800" cy="458787"/>
+          </a:xfrm>
+          <a:prstGeom prst="rect">
+            <a:avLst/>
+          </a:prstGeom>
+        </p:spPr>
+        <p:txBody>
+          <a:bodyPr vert="horz" lIns="91440" tIns="45720" rIns="91440" bIns="45720" rtlCol="0" anchor="b"/>
+          <a:lstStyle>
+            <a:lvl1pPr algn="r">
+              <a:defRPr sz="1200"/>
+            </a:lvl1pPr>
+          </a:lstStyle>
+          <a:p>
+            <a:fld id="{6216B31C-3472-445A-A0DA-BD1F4C5DE9AF}" type="slidenum">
+              <a:rPr lang="en-IN" smtClean="0"/>
+              <a:t>‹#›</a:t>
+            </a:fld>
+            <a:endParaRPr lang="en-IN"/>
+          </a:p>
+        </p:txBody>
+      </p:sp>
+    </p:spTree>
+    <p:extLst>
+      <p:ext uri="{BB962C8B-B14F-4D97-AF65-F5344CB8AC3E}">
+        <p14:creationId xmlns:p14="http://schemas.microsoft.com/office/powerpoint/2010/main" val="1944217787"/>
+      </p:ext>
+    </p:extLst>
+  </p:cSld>
+  <p:clrMap bg1="lt1" tx1="dk1" bg2="lt2" tx2="dk2" accent1="accent1" accent2="accent2" accent3="accent3" accent4="accent4" accent5="accent5" accent6="accent6" hlink="hlink" folHlink="folHlink"/>
+  <p:notesStyle>
+    <a:lvl1pPr marL="0" algn="l" defTabSz="914400" rtl="0" eaLnBrk="1" latinLnBrk="0" hangingPunct="1">
+      <a:defRPr sz="1200" kern="1200">
+        <a:solidFill>
+          <a:schemeClr val="tx1"/>
+        </a:solidFill>
+        <a:latin typeface="+mn-lt"/>
+        <a:ea typeface="+mn-ea"/>
+        <a:cs typeface="+mn-cs"/>
+      </a:defRPr>
+    </a:lvl1pPr>
+    <a:lvl2pPr marL="457200" algn="l" defTabSz="914400" rtl="0" eaLnBrk="1" latinLnBrk="0" hangingPunct="1">
+      <a:defRPr sz="1200" kern="1200">
+        <a:solidFill>
+          <a:schemeClr val="tx1"/>
+        </a:solidFill>
+        <a:latin typeface="+mn-lt"/>
+        <a:ea typeface="+mn-ea"/>
+        <a:cs typeface="+mn-cs"/>
+      </a:defRPr>
+    </a:lvl2pPr>
+    <a:lvl3pPr marL="914400" algn="l" defTabSz="914400" rtl="0" eaLnBrk="1" latinLnBrk="0" hangingPunct="1">
+      <a:defRPr sz="1200" kern="1200">
+        <a:solidFill>
+          <a:schemeClr val="tx1"/>
+        </a:solidFill>
+        <a:latin typeface="+mn-lt"/>
+        <a:ea typeface="+mn-ea"/>
+        <a:cs typeface="+mn-cs"/>
+      </a:defRPr>
+    </a:lvl3pPr>
+    <a:lvl4pPr marL="1371600" algn="l" defTabSz="914400" rtl="0" eaLnBrk="1" latinLnBrk="0" hangingPunct="1">
+      <a:defRPr sz="1200" kern="1200">
+        <a:solidFill>
+          <a:schemeClr val="tx1"/>
+        </a:solidFill>
+        <a:latin typeface="+mn-lt"/>
+        <a:ea typeface="+mn-ea"/>
+        <a:cs typeface="+mn-cs"/>
+      </a:defRPr>
+    </a:lvl4pPr>
+    <a:lvl5pPr marL="1828800" algn="l" defTabSz="914400" rtl="0" eaLnBrk="1" latinLnBrk="0" hangingPunct="1">
+      <a:defRPr sz="1200" kern="1200">
+        <a:solidFill>
+          <a:schemeClr val="tx1"/>
+        </a:solidFill>
+        <a:latin typeface="+mn-lt"/>
+        <a:ea typeface="+mn-ea"/>
+        <a:cs typeface="+mn-cs"/>
+      </a:defRPr>
+    </a:lvl5pPr>
+    <a:lvl6pPr marL="2286000" algn="l" defTabSz="914400" rtl="0" eaLnBrk="1" latinLnBrk="0" hangingPunct="1">
+      <a:defRPr sz="1200" kern="1200">
+        <a:solidFill>
+          <a:schemeClr val="tx1"/>
+        </a:solidFill>
+        <a:latin typeface="+mn-lt"/>
+        <a:ea typeface="+mn-ea"/>
+        <a:cs typeface="+mn-cs"/>
+      </a:defRPr>
+    </a:lvl6pPr>
+    <a:lvl7pPr marL="2743200" algn="l" defTabSz="914400" rtl="0" eaLnBrk="1" latinLnBrk="0" hangingPunct="1">
+      <a:defRPr sz="1200" kern="1200">
+        <a:solidFill>
+          <a:schemeClr val="tx1"/>
+        </a:solidFill>
+        <a:latin typeface="+mn-lt"/>
+        <a:ea typeface="+mn-ea"/>
+        <a:cs typeface="+mn-cs"/>
+      </a:defRPr>
+    </a:lvl7pPr>
+    <a:lvl8pPr marL="3200400" algn="l" defTabSz="914400" rtl="0" eaLnBrk="1" latinLnBrk="0" hangingPunct="1">
+      <a:defRPr sz="1200" kern="1200">
+        <a:solidFill>
+          <a:schemeClr val="tx1"/>
+        </a:solidFill>
+        <a:latin typeface="+mn-lt"/>
+        <a:ea typeface="+mn-ea"/>
+        <a:cs typeface="+mn-cs"/>
+      </a:defRPr>
+    </a:lvl8pPr>
+    <a:lvl9pPr marL="3657600" algn="l" defTabSz="914400" rtl="0" eaLnBrk="1" latinLnBrk="0" hangingPunct="1">
+      <a:defRPr sz="1200" kern="1200">
+        <a:solidFill>
+          <a:schemeClr val="tx1"/>
+        </a:solidFill>
+        <a:latin typeface="+mn-lt"/>
+        <a:ea typeface="+mn-ea"/>
+        <a:cs typeface="+mn-cs"/>
+      </a:defRPr>
+    </a:lvl9pPr>
+  </p:notesStyle>
+</p:notesMaster>
+</file>
+
+<file path=ppt/notesSlides/notesSlide1.xml><?xml version="1.0" encoding="utf-8"?>
+<p:notes xmlns:a="http://schemas.openxmlformats.org/drawingml/2006/main" xmlns:r="http://schemas.openxmlformats.org/officeDocument/2006/relationships" xmlns:p="http://schemas.openxmlformats.org/presentationml/2006/main">
+  <p:cSld>
+    <p:spTree>
+      <p:nvGrpSpPr>
+        <p:cNvPr id="1" name=""/>
+        <p:cNvGrpSpPr/>
+        <p:nvPr/>
+      </p:nvGrpSpPr>
+      <p:grpSpPr>
+        <a:xfrm>
+          <a:off x="0" y="0"/>
+          <a:ext cx="0" cy="0"/>
+          <a:chOff x="0" y="0"/>
+          <a:chExt cx="0" cy="0"/>
+        </a:xfrm>
+      </p:grpSpPr>
+      <p:sp>
+        <p:nvSpPr>
+          <p:cNvPr id="2" name="Slide Image Placeholder 1"/>
+          <p:cNvSpPr>
+            <a:spLocks noGrp="1" noRot="1" noChangeAspect="1"/>
+          </p:cNvSpPr>
+          <p:nvPr>
+            <p:ph type="sldImg"/>
+          </p:nvPr>
+        </p:nvSpPr>
+        <p:spPr/>
+      </p:sp>
+      <p:sp>
+        <p:nvSpPr>
+          <p:cNvPr id="3" name="Notes Placeholder 2"/>
+          <p:cNvSpPr>
+            <a:spLocks noGrp="1"/>
+          </p:cNvSpPr>
+          <p:nvPr>
+            <p:ph type="body" idx="1"/>
+          </p:nvPr>
+        </p:nvSpPr>
+        <p:spPr/>
+        <p:txBody>
+          <a:bodyPr/>
+          <a:lstStyle/>
+          <a:p>
+            <a:endParaRPr lang="en-IN" dirty="0"/>
+          </a:p>
+        </p:txBody>
+      </p:sp>
+      <p:sp>
+        <p:nvSpPr>
+          <p:cNvPr id="4" name="Slide Number Placeholder 3"/>
+          <p:cNvSpPr>
+            <a:spLocks noGrp="1"/>
+          </p:cNvSpPr>
+          <p:nvPr>
+            <p:ph type="sldNum" sz="quarter" idx="5"/>
+          </p:nvPr>
+        </p:nvSpPr>
+        <p:spPr/>
+        <p:txBody>
+          <a:bodyPr/>
+          <a:lstStyle/>
+          <a:p>
+            <a:fld id="{6216B31C-3472-445A-A0DA-BD1F4C5DE9AF}" type="slidenum">
+              <a:rPr lang="en-IN" smtClean="0"/>
+              <a:t>2</a:t>
+            </a:fld>
+            <a:endParaRPr lang="en-IN"/>
+          </a:p>
+        </p:txBody>
+      </p:sp>
+    </p:spTree>
+    <p:extLst>
+      <p:ext uri="{BB962C8B-B14F-4D97-AF65-F5344CB8AC3E}">
+        <p14:creationId xmlns:p14="http://schemas.microsoft.com/office/powerpoint/2010/main" val="4154068704"/>
+      </p:ext>
+    </p:extLst>
+  </p:cSld>
+  <p:clrMapOvr>
+    <a:masterClrMapping/>
+  </p:clrMapOvr>
+</p:notes>
 </file>
 
 <file path=ppt/slideLayouts/slideLayout1.xml><?xml version="1.0" encoding="utf-8"?>
@@ -4120,7 +4559,7 @@
         <p:spPr>
           <a:xfrm>
             <a:off x="497840" y="1117600"/>
-            <a:ext cx="11328400" cy="3323987"/>
+            <a:ext cx="11328400" cy="4154984"/>
           </a:xfrm>
           <a:prstGeom prst="rect">
             <a:avLst/>
@@ -4150,11 +4589,28 @@
               <a:rPr lang="en-US" dirty="0">
                 <a:cs typeface="Arial" panose="020B0604020202020204" pitchFamily="34" charset="0"/>
               </a:rPr>
-              <a:t>This exercise is aimed /sponsored by the city council of Toronto. However the information here in will serve handy for the below groups/individuals as well:</a:t>
-            </a:r>
-          </a:p>
-          <a:p>
-            <a:endParaRPr lang="en-US" dirty="0">
+              <a:t>The data set used for the purposes of this exercise has been downloaded from Toronto CA City government website.</a:t>
+            </a:r>
+          </a:p>
+          <a:p>
+            <a:endParaRPr lang="en-US" u="sng" dirty="0">
+              <a:cs typeface="Arial" panose="020B0604020202020204" pitchFamily="34" charset="0"/>
+            </a:endParaRPr>
+          </a:p>
+          <a:p>
+            <a:r>
+              <a:rPr lang="en-US" u="sng" dirty="0">
+                <a:cs typeface="Arial" panose="020B0604020202020204" pitchFamily="34" charset="0"/>
+                <a:hlinkClick r:id="rId2"/>
+              </a:rPr>
+              <a:t>https://www.toronto.ca/city-government/data-research-maps/open-data/open-data-catalogue/culture-and-tourism/#1b3c08c4-0316-fc59-88c6-e6d7178a2cf8</a:t>
+            </a:r>
+            <a:endParaRPr lang="en-US" u="sng" dirty="0">
+              <a:cs typeface="Arial" panose="020B0604020202020204" pitchFamily="34" charset="0"/>
+            </a:endParaRPr>
+          </a:p>
+          <a:p>
+            <a:endParaRPr lang="en-US" u="sng" dirty="0">
               <a:cs typeface="Arial" panose="020B0604020202020204" pitchFamily="34" charset="0"/>
             </a:endParaRPr>
           </a:p>
@@ -4167,7 +4623,7 @@
               <a:rPr lang="en-US" dirty="0">
                 <a:cs typeface="Arial" panose="020B0604020202020204" pitchFamily="34" charset="0"/>
               </a:rPr>
-              <a:t>Press: for the purposes of marketing/  information dissemination to general public</a:t>
+              <a:t>File Name: MSFC_44 Wards_Complete_Final.xlsx</a:t>
             </a:r>
           </a:p>
           <a:p>
@@ -4179,7 +4635,7 @@
               <a:rPr lang="en-US" dirty="0">
                 <a:cs typeface="Arial" panose="020B0604020202020204" pitchFamily="34" charset="0"/>
               </a:rPr>
-              <a:t>City building contractors</a:t>
+              <a:t>Data Dictionary : MSFC_Readme.xls</a:t>
             </a:r>
           </a:p>
           <a:p>
@@ -4187,61 +4643,39 @@
               <a:buFont typeface="Arial" panose="020B0604020202020204" pitchFamily="34" charset="0"/>
               <a:buChar char="•"/>
             </a:pPr>
-            <a:r>
-              <a:rPr lang="en-US" dirty="0">
-                <a:cs typeface="Arial" panose="020B0604020202020204" pitchFamily="34" charset="0"/>
-              </a:rPr>
-              <a:t>Current and potential future investors and patrons of the arts</a:t>
-            </a:r>
+            <a:endParaRPr lang="en-US" dirty="0">
+              <a:cs typeface="Arial" panose="020B0604020202020204" pitchFamily="34" charset="0"/>
+            </a:endParaRPr>
           </a:p>
           <a:p>
             <a:pPr marL="342900" indent="-342900">
               <a:buFont typeface="Arial" panose="020B0604020202020204" pitchFamily="34" charset="0"/>
               <a:buChar char="•"/>
             </a:pPr>
-            <a:r>
-              <a:rPr lang="en-US" dirty="0">
+            <a:endParaRPr lang="en-US" dirty="0">
+              <a:cs typeface="Arial" panose="020B0604020202020204" pitchFamily="34" charset="0"/>
+            </a:endParaRPr>
+          </a:p>
+          <a:p>
+            <a:r>
+              <a:rPr lang="en-US" i="1" dirty="0">
                 <a:cs typeface="Arial" panose="020B0604020202020204" pitchFamily="34" charset="0"/>
               </a:rPr>
-              <a:t>Various charities/community outreach programs</a:t>
-            </a:r>
-          </a:p>
-          <a:p>
-            <a:pPr marL="342900" indent="-342900">
-              <a:buFont typeface="Arial" panose="020B0604020202020204" pitchFamily="34" charset="0"/>
-              <a:buChar char="•"/>
-            </a:pPr>
-            <a:r>
-              <a:rPr lang="en-US" dirty="0">
+              <a:t>*** Datasets are made freely available for anyone under the City’s Open Government </a:t>
+            </a:r>
+            <a:r>
+              <a:rPr lang="en-US" i="1" dirty="0" err="1">
                 <a:cs typeface="Arial" panose="020B0604020202020204" pitchFamily="34" charset="0"/>
               </a:rPr>
-              <a:t>Event planners/ organizers</a:t>
-            </a:r>
-          </a:p>
-          <a:p>
-            <a:pPr marL="342900" indent="-342900">
-              <a:buFont typeface="Arial" panose="020B0604020202020204" pitchFamily="34" charset="0"/>
-              <a:buChar char="•"/>
-            </a:pPr>
-            <a:r>
-              <a:rPr lang="en-US" u="sng" dirty="0">
+              <a:t>Licence</a:t>
+            </a:r>
+            <a:r>
+              <a:rPr lang="en-US" i="1" dirty="0">
                 <a:cs typeface="Arial" panose="020B0604020202020204" pitchFamily="34" charset="0"/>
               </a:rPr>
-              <a:t>Last but  not the least</a:t>
-            </a:r>
-            <a:r>
-              <a:rPr lang="en-US" dirty="0">
-                <a:cs typeface="Arial" panose="020B0604020202020204" pitchFamily="34" charset="0"/>
-              </a:rPr>
-              <a:t>, </a:t>
-            </a:r>
-            <a:r>
-              <a:rPr lang="en-US" u="sng" dirty="0">
-                <a:cs typeface="Arial" panose="020B0604020202020204" pitchFamily="34" charset="0"/>
-              </a:rPr>
-              <a:t>general public</a:t>
-            </a:r>
-            <a:endParaRPr lang="en-IN" u="sng" dirty="0">
+              <a:t>, which is based on version 1.0 of the Open Government License – Ontario. This license allows worldwide, royalty-free, perpetual, non-exclusive license to use the City’s open datasets, for both commercial and non-commercial use.</a:t>
+            </a:r>
+            <a:endParaRPr lang="en-IN" i="1" dirty="0">
               <a:cs typeface="Arial" panose="020B0604020202020204" pitchFamily="34" charset="0"/>
             </a:endParaRPr>
           </a:p>
@@ -4342,6 +4776,629 @@
     <p:extLst>
       <p:ext uri="{BB962C8B-B14F-4D97-AF65-F5344CB8AC3E}">
         <p14:creationId xmlns:p14="http://schemas.microsoft.com/office/powerpoint/2010/main" val="4256571488"/>
+      </p:ext>
+    </p:extLst>
+  </p:cSld>
+  <p:clrMapOvr>
+    <a:masterClrMapping/>
+  </p:clrMapOvr>
+</p:sld>
+</file>
+
+<file path=ppt/slides/slide5.xml><?xml version="1.0" encoding="utf-8"?>
+<p:sld xmlns:a="http://schemas.openxmlformats.org/drawingml/2006/main" xmlns:r="http://schemas.openxmlformats.org/officeDocument/2006/relationships" xmlns:p="http://schemas.openxmlformats.org/presentationml/2006/main">
+  <p:cSld>
+    <p:spTree>
+      <p:nvGrpSpPr>
+        <p:cNvPr id="1" name=""/>
+        <p:cNvGrpSpPr/>
+        <p:nvPr/>
+      </p:nvGrpSpPr>
+      <p:grpSpPr>
+        <a:xfrm>
+          <a:off x="0" y="0"/>
+          <a:ext cx="0" cy="0"/>
+          <a:chOff x="0" y="0"/>
+          <a:chExt cx="0" cy="0"/>
+        </a:xfrm>
+      </p:grpSpPr>
+      <p:sp>
+        <p:nvSpPr>
+          <p:cNvPr id="11" name="TextBox 10">
+            <a:extLst>
+              <a:ext uri="{FF2B5EF4-FFF2-40B4-BE49-F238E27FC236}">
+                <a16:creationId xmlns:a16="http://schemas.microsoft.com/office/drawing/2014/main" id="{755C591E-4B62-49A6-8320-86AB57053E48}"/>
+              </a:ext>
+            </a:extLst>
+          </p:cNvPr>
+          <p:cNvSpPr txBox="1"/>
+          <p:nvPr/>
+        </p:nvSpPr>
+        <p:spPr>
+          <a:xfrm>
+            <a:off x="497840" y="1117600"/>
+            <a:ext cx="11328400" cy="4985980"/>
+          </a:xfrm>
+          <a:prstGeom prst="rect">
+            <a:avLst/>
+          </a:prstGeom>
+          <a:noFill/>
+        </p:spPr>
+        <p:txBody>
+          <a:bodyPr wrap="square" rtlCol="0">
+            <a:spAutoFit/>
+          </a:bodyPr>
+          <a:lstStyle/>
+          <a:p>
+            <a:r>
+              <a:rPr lang="en-US" sz="1600" b="1" dirty="0">
+                <a:cs typeface="Arial" panose="020B0604020202020204" pitchFamily="34" charset="0"/>
+              </a:rPr>
+              <a:t>OBSERVATIONS POST ANALYSIS:</a:t>
+            </a:r>
+          </a:p>
+          <a:p>
+            <a:endParaRPr lang="en-US" sz="1600" b="1" dirty="0">
+              <a:cs typeface="Arial" panose="020B0604020202020204" pitchFamily="34" charset="0"/>
+            </a:endParaRPr>
+          </a:p>
+          <a:p>
+            <a:r>
+              <a:rPr lang="en-US" dirty="0">
+                <a:cs typeface="Arial" panose="020B0604020202020204" pitchFamily="34" charset="0"/>
+              </a:rPr>
+              <a:t>By the end of following this particular notebook, how we came to the following analysis will be clear. However to intrigue the readers interest and for quick clarity , earmarking few critical observations upfront.</a:t>
+            </a:r>
+          </a:p>
+          <a:p>
+            <a:endParaRPr lang="en-US" u="sng" dirty="0">
+              <a:cs typeface="Arial" panose="020B0604020202020204" pitchFamily="34" charset="0"/>
+            </a:endParaRPr>
+          </a:p>
+          <a:p>
+            <a:pPr marL="342900" indent="-342900">
+              <a:buFont typeface="Arial" panose="020B0604020202020204" pitchFamily="34" charset="0"/>
+              <a:buChar char="•"/>
+            </a:pPr>
+            <a:r>
+              <a:rPr lang="en-US" dirty="0">
+                <a:cs typeface="Arial" panose="020B0604020202020204" pitchFamily="34" charset="0"/>
+              </a:rPr>
+              <a:t>City of Toronto has close to 1600 culture and community centers spread across its various wards</a:t>
+            </a:r>
+          </a:p>
+          <a:p>
+            <a:endParaRPr lang="en-US" dirty="0">
+              <a:cs typeface="Arial" panose="020B0604020202020204" pitchFamily="34" charset="0"/>
+            </a:endParaRPr>
+          </a:p>
+          <a:p>
+            <a:pPr marL="342900" indent="-342900">
+              <a:buFont typeface="Arial" panose="020B0604020202020204" pitchFamily="34" charset="0"/>
+              <a:buChar char="•"/>
+            </a:pPr>
+            <a:r>
+              <a:rPr lang="en-US" dirty="0">
+                <a:cs typeface="Arial" panose="020B0604020202020204" pitchFamily="34" charset="0"/>
+              </a:rPr>
+              <a:t>Majority (~700) of these community centers facilitate performance</a:t>
+            </a:r>
+          </a:p>
+          <a:p>
+            <a:endParaRPr lang="en-US" dirty="0">
+              <a:cs typeface="Arial" panose="020B0604020202020204" pitchFamily="34" charset="0"/>
+            </a:endParaRPr>
+          </a:p>
+          <a:p>
+            <a:pPr marL="342900" indent="-342900">
+              <a:buFont typeface="Arial" panose="020B0604020202020204" pitchFamily="34" charset="0"/>
+              <a:buChar char="•"/>
+            </a:pPr>
+            <a:r>
+              <a:rPr lang="en-US" dirty="0">
+                <a:cs typeface="Arial" panose="020B0604020202020204" pitchFamily="34" charset="0"/>
+              </a:rPr>
+              <a:t>City has only ~100 public libraries</a:t>
+            </a:r>
+          </a:p>
+          <a:p>
+            <a:endParaRPr lang="en-US" dirty="0">
+              <a:cs typeface="Arial" panose="020B0604020202020204" pitchFamily="34" charset="0"/>
+            </a:endParaRPr>
+          </a:p>
+          <a:p>
+            <a:pPr marL="342900" indent="-342900">
+              <a:buFont typeface="Arial" panose="020B0604020202020204" pitchFamily="34" charset="0"/>
+              <a:buChar char="•"/>
+            </a:pPr>
+            <a:r>
+              <a:rPr lang="en-US" dirty="0">
+                <a:cs typeface="Arial" panose="020B0604020202020204" pitchFamily="34" charset="0"/>
+              </a:rPr>
+              <a:t>Majority (~1100) of these community centers are not owned or operated by the city</a:t>
+            </a:r>
+          </a:p>
+          <a:p>
+            <a:endParaRPr lang="en-US" dirty="0">
+              <a:cs typeface="Arial" panose="020B0604020202020204" pitchFamily="34" charset="0"/>
+            </a:endParaRPr>
+          </a:p>
+          <a:p>
+            <a:pPr marL="342900" indent="-342900">
+              <a:buFont typeface="Arial" panose="020B0604020202020204" pitchFamily="34" charset="0"/>
+              <a:buChar char="•"/>
+            </a:pPr>
+            <a:r>
+              <a:rPr lang="en-US" dirty="0">
+                <a:cs typeface="Arial" panose="020B0604020202020204" pitchFamily="34" charset="0"/>
+              </a:rPr>
+              <a:t>Ward 20 in Toronto – Scarborough Southwest has the highest concentration of community centers</a:t>
+            </a:r>
+          </a:p>
+          <a:p>
+            <a:pPr marL="342900" indent="-342900">
+              <a:buFont typeface="Arial" panose="020B0604020202020204" pitchFamily="34" charset="0"/>
+              <a:buChar char="•"/>
+            </a:pPr>
+            <a:endParaRPr lang="en-US" dirty="0">
+              <a:cs typeface="Arial" panose="020B0604020202020204" pitchFamily="34" charset="0"/>
+            </a:endParaRPr>
+          </a:p>
+          <a:p>
+            <a:pPr marL="342900" indent="-342900">
+              <a:buFont typeface="Arial" panose="020B0604020202020204" pitchFamily="34" charset="0"/>
+              <a:buChar char="•"/>
+            </a:pPr>
+            <a:endParaRPr lang="en-US" dirty="0">
+              <a:cs typeface="Arial" panose="020B0604020202020204" pitchFamily="34" charset="0"/>
+            </a:endParaRPr>
+          </a:p>
+          <a:p>
+            <a:pPr marL="342900" indent="-342900">
+              <a:buFont typeface="Arial" panose="020B0604020202020204" pitchFamily="34" charset="0"/>
+              <a:buChar char="•"/>
+            </a:pPr>
+            <a:endParaRPr lang="en-US" dirty="0">
+              <a:cs typeface="Arial" panose="020B0604020202020204" pitchFamily="34" charset="0"/>
+            </a:endParaRPr>
+          </a:p>
+          <a:p>
+            <a:endParaRPr lang="en-IN" sz="1600" b="1" dirty="0">
+              <a:cs typeface="Arial" panose="020B0604020202020204" pitchFamily="34" charset="0"/>
+            </a:endParaRPr>
+          </a:p>
+        </p:txBody>
+      </p:sp>
+      <p:sp>
+        <p:nvSpPr>
+          <p:cNvPr id="8" name="TextBox 7">
+            <a:extLst>
+              <a:ext uri="{FF2B5EF4-FFF2-40B4-BE49-F238E27FC236}">
+                <a16:creationId xmlns:a16="http://schemas.microsoft.com/office/drawing/2014/main" id="{7BABADA5-0ED4-45B7-8507-1E990EC25A41}"/>
+              </a:ext>
+            </a:extLst>
+          </p:cNvPr>
+          <p:cNvSpPr txBox="1"/>
+          <p:nvPr/>
+        </p:nvSpPr>
+        <p:spPr>
+          <a:xfrm>
+            <a:off x="443865" y="213360"/>
+            <a:ext cx="11304270" cy="523220"/>
+          </a:xfrm>
+          <a:prstGeom prst="rect">
+            <a:avLst/>
+          </a:prstGeom>
+          <a:noFill/>
+        </p:spPr>
+        <p:txBody>
+          <a:bodyPr wrap="square" rtlCol="0">
+            <a:spAutoFit/>
+          </a:bodyPr>
+          <a:lstStyle/>
+          <a:p>
+            <a:r>
+              <a:rPr lang="en-US" sz="2800" b="1" dirty="0">
+                <a:latin typeface="Arial Black" panose="020B0A04020102020204" pitchFamily="34" charset="0"/>
+              </a:rPr>
+              <a:t>Toronto: Analysis of Culture &amp; Community Centers</a:t>
+            </a:r>
+            <a:endParaRPr lang="en-IN" sz="2800" b="1" dirty="0">
+              <a:latin typeface="Arial Black" panose="020B0A04020102020204" pitchFamily="34" charset="0"/>
+            </a:endParaRPr>
+          </a:p>
+        </p:txBody>
+      </p:sp>
+      <p:sp>
+        <p:nvSpPr>
+          <p:cNvPr id="2" name="Rectangle 1">
+            <a:extLst>
+              <a:ext uri="{FF2B5EF4-FFF2-40B4-BE49-F238E27FC236}">
+                <a16:creationId xmlns:a16="http://schemas.microsoft.com/office/drawing/2014/main" id="{40402CB1-38F6-4FDA-B217-C4ED02C1F16C}"/>
+              </a:ext>
+            </a:extLst>
+          </p:cNvPr>
+          <p:cNvSpPr/>
+          <p:nvPr/>
+        </p:nvSpPr>
+        <p:spPr>
+          <a:xfrm>
+            <a:off x="183827" y="838180"/>
+            <a:ext cx="11364607" cy="45720"/>
+          </a:xfrm>
+          <a:prstGeom prst="rect">
+            <a:avLst/>
+          </a:prstGeom>
+        </p:spPr>
+        <p:style>
+          <a:lnRef idx="2">
+            <a:schemeClr val="accent1">
+              <a:shade val="50000"/>
+            </a:schemeClr>
+          </a:lnRef>
+          <a:fillRef idx="1">
+            <a:schemeClr val="accent1"/>
+          </a:fillRef>
+          <a:effectRef idx="0">
+            <a:schemeClr val="accent1"/>
+          </a:effectRef>
+          <a:fontRef idx="minor">
+            <a:schemeClr val="lt1"/>
+          </a:fontRef>
+        </p:style>
+        <p:txBody>
+          <a:bodyPr rtlCol="0" anchor="ctr"/>
+          <a:lstStyle/>
+          <a:p>
+            <a:pPr algn="ctr"/>
+            <a:endParaRPr lang="en-IN"/>
+          </a:p>
+        </p:txBody>
+      </p:sp>
+    </p:spTree>
+    <p:extLst>
+      <p:ext uri="{BB962C8B-B14F-4D97-AF65-F5344CB8AC3E}">
+        <p14:creationId xmlns:p14="http://schemas.microsoft.com/office/powerpoint/2010/main" val="3245042585"/>
+      </p:ext>
+    </p:extLst>
+  </p:cSld>
+  <p:clrMapOvr>
+    <a:masterClrMapping/>
+  </p:clrMapOvr>
+</p:sld>
+</file>
+
+<file path=ppt/slides/slide6.xml><?xml version="1.0" encoding="utf-8"?>
+<p:sld xmlns:a="http://schemas.openxmlformats.org/drawingml/2006/main" xmlns:r="http://schemas.openxmlformats.org/officeDocument/2006/relationships" xmlns:p="http://schemas.openxmlformats.org/presentationml/2006/main">
+  <p:cSld>
+    <p:spTree>
+      <p:nvGrpSpPr>
+        <p:cNvPr id="1" name=""/>
+        <p:cNvGrpSpPr/>
+        <p:nvPr/>
+      </p:nvGrpSpPr>
+      <p:grpSpPr>
+        <a:xfrm>
+          <a:off x="0" y="0"/>
+          <a:ext cx="0" cy="0"/>
+          <a:chOff x="0" y="0"/>
+          <a:chExt cx="0" cy="0"/>
+        </a:xfrm>
+      </p:grpSpPr>
+      <p:sp>
+        <p:nvSpPr>
+          <p:cNvPr id="11" name="TextBox 10">
+            <a:extLst>
+              <a:ext uri="{FF2B5EF4-FFF2-40B4-BE49-F238E27FC236}">
+                <a16:creationId xmlns:a16="http://schemas.microsoft.com/office/drawing/2014/main" id="{755C591E-4B62-49A6-8320-86AB57053E48}"/>
+              </a:ext>
+            </a:extLst>
+          </p:cNvPr>
+          <p:cNvSpPr txBox="1"/>
+          <p:nvPr/>
+        </p:nvSpPr>
+        <p:spPr>
+          <a:xfrm>
+            <a:off x="497840" y="1117600"/>
+            <a:ext cx="11328400" cy="6924973"/>
+          </a:xfrm>
+          <a:prstGeom prst="rect">
+            <a:avLst/>
+          </a:prstGeom>
+          <a:noFill/>
+        </p:spPr>
+        <p:txBody>
+          <a:bodyPr wrap="square" rtlCol="0">
+            <a:spAutoFit/>
+          </a:bodyPr>
+          <a:lstStyle/>
+          <a:p>
+            <a:r>
+              <a:rPr lang="en-US" sz="1600" b="1" dirty="0">
+                <a:cs typeface="Arial" panose="020B0604020202020204" pitchFamily="34" charset="0"/>
+              </a:rPr>
+              <a:t>CONCLUSION:</a:t>
+            </a:r>
+          </a:p>
+          <a:p>
+            <a:endParaRPr lang="en-US" sz="1600" b="1" dirty="0">
+              <a:cs typeface="Arial" panose="020B0604020202020204" pitchFamily="34" charset="0"/>
+            </a:endParaRPr>
+          </a:p>
+          <a:p>
+            <a:r>
+              <a:rPr lang="en-US" dirty="0">
+                <a:cs typeface="Arial" panose="020B0604020202020204" pitchFamily="34" charset="0"/>
+              </a:rPr>
+              <a:t>Based on our data analysis exercise we can conclude the following:</a:t>
+            </a:r>
+          </a:p>
+          <a:p>
+            <a:endParaRPr lang="en-US" u="sng" dirty="0">
+              <a:cs typeface="Arial" panose="020B0604020202020204" pitchFamily="34" charset="0"/>
+            </a:endParaRPr>
+          </a:p>
+          <a:p>
+            <a:pPr marL="342900" indent="-342900">
+              <a:buFont typeface="Arial" panose="020B0604020202020204" pitchFamily="34" charset="0"/>
+              <a:buChar char="•"/>
+            </a:pPr>
+            <a:r>
+              <a:rPr lang="en-US" dirty="0">
+                <a:cs typeface="Arial" panose="020B0604020202020204" pitchFamily="34" charset="0"/>
+              </a:rPr>
+              <a:t>City of Toronto has close to 1600 culture and community centers spread across its various wards. Density and availability of community centers reduces the further away we are from the city center.</a:t>
+            </a:r>
+          </a:p>
+          <a:p>
+            <a:endParaRPr lang="en-US" dirty="0">
+              <a:cs typeface="Arial" panose="020B0604020202020204" pitchFamily="34" charset="0"/>
+            </a:endParaRPr>
+          </a:p>
+          <a:p>
+            <a:pPr marL="342900" indent="-342900">
+              <a:buFont typeface="Arial" panose="020B0604020202020204" pitchFamily="34" charset="0"/>
+              <a:buChar char="•"/>
+            </a:pPr>
+            <a:r>
+              <a:rPr lang="en-US" dirty="0">
+                <a:cs typeface="Arial" panose="020B0604020202020204" pitchFamily="34" charset="0"/>
+              </a:rPr>
+              <a:t>Majority (~700) of these community centers facilitate performance</a:t>
+            </a:r>
+          </a:p>
+          <a:p>
+            <a:endParaRPr lang="en-US" dirty="0">
+              <a:cs typeface="Arial" panose="020B0604020202020204" pitchFamily="34" charset="0"/>
+            </a:endParaRPr>
+          </a:p>
+          <a:p>
+            <a:pPr marL="342900" indent="-342900">
+              <a:buFont typeface="Arial" panose="020B0604020202020204" pitchFamily="34" charset="0"/>
+              <a:buChar char="•"/>
+            </a:pPr>
+            <a:r>
+              <a:rPr lang="en-US" dirty="0">
+                <a:cs typeface="Arial" panose="020B0604020202020204" pitchFamily="34" charset="0"/>
+              </a:rPr>
+              <a:t>City has only ~100 public libraries. The highest number of libraries at a particular ward is only 5.</a:t>
+            </a:r>
+          </a:p>
+          <a:p>
+            <a:endParaRPr lang="en-US" dirty="0">
+              <a:cs typeface="Arial" panose="020B0604020202020204" pitchFamily="34" charset="0"/>
+            </a:endParaRPr>
+          </a:p>
+          <a:p>
+            <a:pPr marL="342900" indent="-342900">
+              <a:buFont typeface="Arial" panose="020B0604020202020204" pitchFamily="34" charset="0"/>
+              <a:buChar char="•"/>
+            </a:pPr>
+            <a:r>
+              <a:rPr lang="en-US" dirty="0">
+                <a:cs typeface="Arial" panose="020B0604020202020204" pitchFamily="34" charset="0"/>
+              </a:rPr>
+              <a:t>Majority (~1100) of these community centers are not owned or operated by the city.</a:t>
+            </a:r>
+          </a:p>
+          <a:p>
+            <a:endParaRPr lang="en-US" dirty="0">
+              <a:cs typeface="Arial" panose="020B0604020202020204" pitchFamily="34" charset="0"/>
+            </a:endParaRPr>
+          </a:p>
+          <a:p>
+            <a:pPr marL="342900" indent="-342900">
+              <a:buFont typeface="Arial" panose="020B0604020202020204" pitchFamily="34" charset="0"/>
+              <a:buChar char="•"/>
+            </a:pPr>
+            <a:r>
+              <a:rPr lang="en-US" dirty="0">
+                <a:cs typeface="Arial" panose="020B0604020202020204" pitchFamily="34" charset="0"/>
+              </a:rPr>
+              <a:t>Ward 20 in Toronto – Scarborough Southwest has the highest concentration of community centers. This can be attributed to private sponsorship and investment as majority of private stake community centers are also in this particular ward</a:t>
+            </a:r>
+          </a:p>
+          <a:p>
+            <a:pPr marL="342900" indent="-342900">
+              <a:buFont typeface="Arial" panose="020B0604020202020204" pitchFamily="34" charset="0"/>
+              <a:buChar char="•"/>
+            </a:pPr>
+            <a:endParaRPr lang="en-US" dirty="0">
+              <a:cs typeface="Arial" panose="020B0604020202020204" pitchFamily="34" charset="0"/>
+            </a:endParaRPr>
+          </a:p>
+          <a:p>
+            <a:pPr marL="342900" indent="-342900">
+              <a:buFont typeface="Arial" panose="020B0604020202020204" pitchFamily="34" charset="0"/>
+              <a:buChar char="•"/>
+            </a:pPr>
+            <a:r>
+              <a:rPr lang="en-US" dirty="0">
+                <a:cs typeface="Arial" panose="020B0604020202020204" pitchFamily="34" charset="0"/>
+              </a:rPr>
+              <a:t>Wards which require work in infrastructure of community centers are Scarborough Agincourt , Danforth and </a:t>
+            </a:r>
+            <a:r>
+              <a:rPr lang="en-US" dirty="0" err="1">
+                <a:cs typeface="Arial" panose="020B0604020202020204" pitchFamily="34" charset="0"/>
+              </a:rPr>
+              <a:t>Etiboke</a:t>
+            </a:r>
+            <a:endParaRPr lang="en-US" dirty="0">
+              <a:cs typeface="Arial" panose="020B0604020202020204" pitchFamily="34" charset="0"/>
+            </a:endParaRPr>
+          </a:p>
+          <a:p>
+            <a:pPr marL="342900" indent="-342900">
+              <a:buFont typeface="Arial" panose="020B0604020202020204" pitchFamily="34" charset="0"/>
+              <a:buChar char="•"/>
+            </a:pPr>
+            <a:endParaRPr lang="en-US" dirty="0">
+              <a:cs typeface="Arial" panose="020B0604020202020204" pitchFamily="34" charset="0"/>
+            </a:endParaRPr>
+          </a:p>
+          <a:p>
+            <a:pPr marL="342900" indent="-342900">
+              <a:buFont typeface="Arial" panose="020B0604020202020204" pitchFamily="34" charset="0"/>
+              <a:buChar char="•"/>
+            </a:pPr>
+            <a:endParaRPr lang="en-US" dirty="0">
+              <a:cs typeface="Arial" panose="020B0604020202020204" pitchFamily="34" charset="0"/>
+            </a:endParaRPr>
+          </a:p>
+          <a:p>
+            <a:pPr marL="342900" indent="-342900">
+              <a:buFont typeface="Arial" panose="020B0604020202020204" pitchFamily="34" charset="0"/>
+              <a:buChar char="•"/>
+            </a:pPr>
+            <a:endParaRPr lang="en-US" dirty="0">
+              <a:cs typeface="Arial" panose="020B0604020202020204" pitchFamily="34" charset="0"/>
+            </a:endParaRPr>
+          </a:p>
+          <a:p>
+            <a:pPr marL="342900" indent="-342900">
+              <a:buFont typeface="Arial" panose="020B0604020202020204" pitchFamily="34" charset="0"/>
+              <a:buChar char="•"/>
+            </a:pPr>
+            <a:endParaRPr lang="en-US" dirty="0">
+              <a:cs typeface="Arial" panose="020B0604020202020204" pitchFamily="34" charset="0"/>
+            </a:endParaRPr>
+          </a:p>
+          <a:p>
+            <a:pPr marL="342900" indent="-342900">
+              <a:buFont typeface="Arial" panose="020B0604020202020204" pitchFamily="34" charset="0"/>
+              <a:buChar char="•"/>
+            </a:pPr>
+            <a:endParaRPr lang="en-US" dirty="0">
+              <a:cs typeface="Arial" panose="020B0604020202020204" pitchFamily="34" charset="0"/>
+            </a:endParaRPr>
+          </a:p>
+          <a:p>
+            <a:pPr marL="342900" indent="-342900">
+              <a:buFont typeface="Arial" panose="020B0604020202020204" pitchFamily="34" charset="0"/>
+              <a:buChar char="•"/>
+            </a:pPr>
+            <a:endParaRPr lang="en-US" dirty="0">
+              <a:cs typeface="Arial" panose="020B0604020202020204" pitchFamily="34" charset="0"/>
+            </a:endParaRPr>
+          </a:p>
+          <a:p>
+            <a:endParaRPr lang="en-IN" sz="1600" b="1" dirty="0">
+              <a:cs typeface="Arial" panose="020B0604020202020204" pitchFamily="34" charset="0"/>
+            </a:endParaRPr>
+          </a:p>
+        </p:txBody>
+      </p:sp>
+      <p:sp>
+        <p:nvSpPr>
+          <p:cNvPr id="8" name="TextBox 7">
+            <a:extLst>
+              <a:ext uri="{FF2B5EF4-FFF2-40B4-BE49-F238E27FC236}">
+                <a16:creationId xmlns:a16="http://schemas.microsoft.com/office/drawing/2014/main" id="{7BABADA5-0ED4-45B7-8507-1E990EC25A41}"/>
+              </a:ext>
+            </a:extLst>
+          </p:cNvPr>
+          <p:cNvSpPr txBox="1"/>
+          <p:nvPr/>
+        </p:nvSpPr>
+        <p:spPr>
+          <a:xfrm>
+            <a:off x="443865" y="213360"/>
+            <a:ext cx="11304270" cy="523220"/>
+          </a:xfrm>
+          <a:prstGeom prst="rect">
+            <a:avLst/>
+          </a:prstGeom>
+          <a:noFill/>
+        </p:spPr>
+        <p:txBody>
+          <a:bodyPr wrap="square" rtlCol="0">
+            <a:spAutoFit/>
+          </a:bodyPr>
+          <a:lstStyle/>
+          <a:p>
+            <a:r>
+              <a:rPr lang="en-US" sz="2800" b="1" dirty="0">
+                <a:latin typeface="Arial Black" panose="020B0A04020102020204" pitchFamily="34" charset="0"/>
+              </a:rPr>
+              <a:t>Toronto: Analysis of Culture &amp; Community Centers</a:t>
+            </a:r>
+            <a:endParaRPr lang="en-IN" sz="2800" b="1" dirty="0">
+              <a:latin typeface="Arial Black" panose="020B0A04020102020204" pitchFamily="34" charset="0"/>
+            </a:endParaRPr>
+          </a:p>
+        </p:txBody>
+      </p:sp>
+      <p:sp>
+        <p:nvSpPr>
+          <p:cNvPr id="2" name="Rectangle 1">
+            <a:extLst>
+              <a:ext uri="{FF2B5EF4-FFF2-40B4-BE49-F238E27FC236}">
+                <a16:creationId xmlns:a16="http://schemas.microsoft.com/office/drawing/2014/main" id="{40402CB1-38F6-4FDA-B217-C4ED02C1F16C}"/>
+              </a:ext>
+            </a:extLst>
+          </p:cNvPr>
+          <p:cNvSpPr/>
+          <p:nvPr/>
+        </p:nvSpPr>
+        <p:spPr>
+          <a:xfrm>
+            <a:off x="183827" y="838180"/>
+            <a:ext cx="11364607" cy="45720"/>
+          </a:xfrm>
+          <a:prstGeom prst="rect">
+            <a:avLst/>
+          </a:prstGeom>
+        </p:spPr>
+        <p:style>
+          <a:lnRef idx="2">
+            <a:schemeClr val="accent1">
+              <a:shade val="50000"/>
+            </a:schemeClr>
+          </a:lnRef>
+          <a:fillRef idx="1">
+            <a:schemeClr val="accent1"/>
+          </a:fillRef>
+          <a:effectRef idx="0">
+            <a:schemeClr val="accent1"/>
+          </a:effectRef>
+          <a:fontRef idx="minor">
+            <a:schemeClr val="lt1"/>
+          </a:fontRef>
+        </p:style>
+        <p:txBody>
+          <a:bodyPr rtlCol="0" anchor="ctr"/>
+          <a:lstStyle/>
+          <a:p>
+            <a:pPr algn="ctr"/>
+            <a:endParaRPr lang="en-IN"/>
+          </a:p>
+        </p:txBody>
+      </p:sp>
+    </p:spTree>
+    <p:extLst>
+      <p:ext uri="{BB962C8B-B14F-4D97-AF65-F5344CB8AC3E}">
+        <p14:creationId xmlns:p14="http://schemas.microsoft.com/office/powerpoint/2010/main" val="3802767223"/>
       </p:ext>
     </p:extLst>
   </p:cSld>
@@ -4644,4 +5701,299 @@
     </a:ext>
   </a:extLst>
 </a:theme>
+</file>
+
+<file path=ppt/theme/theme2.xml><?xml version="1.0" encoding="utf-8"?>
+<a:theme xmlns:a="http://schemas.openxmlformats.org/drawingml/2006/main" name="Office Theme">
+  <a:themeElements>
+    <a:clrScheme name="Office">
+      <a:dk1>
+        <a:sysClr val="windowText" lastClr="000000"/>
+      </a:dk1>
+      <a:lt1>
+        <a:sysClr val="window" lastClr="FFFFFF"/>
+      </a:lt1>
+      <a:dk2>
+        <a:srgbClr val="44546A"/>
+      </a:dk2>
+      <a:lt2>
+        <a:srgbClr val="E7E6E6"/>
+      </a:lt2>
+      <a:accent1>
+        <a:srgbClr val="4472C4"/>
+      </a:accent1>
+      <a:accent2>
+        <a:srgbClr val="ED7D31"/>
+      </a:accent2>
+      <a:accent3>
+        <a:srgbClr val="A5A5A5"/>
+      </a:accent3>
+      <a:accent4>
+        <a:srgbClr val="FFC000"/>
+      </a:accent4>
+      <a:accent5>
+        <a:srgbClr val="5B9BD5"/>
+      </a:accent5>
+      <a:accent6>
+        <a:srgbClr val="70AD47"/>
+      </a:accent6>
+      <a:hlink>
+        <a:srgbClr val="0563C1"/>
+      </a:hlink>
+      <a:folHlink>
+        <a:srgbClr val="954F72"/>
+      </a:folHlink>
+    </a:clrScheme>
+    <a:fontScheme name="Office">
+      <a:majorFont>
+        <a:latin typeface="Calibri Light" panose="020F0302020204030204"/>
+        <a:ea typeface=""/>
+        <a:cs typeface=""/>
+        <a:font script="Jpan" typeface="游ゴシック Light"/>
+        <a:font script="Hang" typeface="맑은 고딕"/>
+        <a:font script="Hans" typeface="等线 Light"/>
+        <a:font script="Hant" typeface="新細明體"/>
+        <a:font script="Arab" typeface="Times New Roman"/>
+        <a:font script="Hebr" typeface="Times New Roman"/>
+        <a:font script="Thai" typeface="Angsana New"/>
+        <a:font script="Ethi" typeface="Nyala"/>
+        <a:font script="Beng" typeface="Vrinda"/>
+        <a:font script="Gujr" typeface="Shruti"/>
+        <a:font script="Khmr" typeface="MoolBoran"/>
+        <a:font script="Knda" typeface="Tunga"/>
+        <a:font script="Guru" typeface="Raavi"/>
+        <a:font script="Cans" typeface="Euphemia"/>
+        <a:font script="Cher" typeface="Plantagenet Cherokee"/>
+        <a:font script="Yiii" typeface="Microsoft Yi Baiti"/>
+        <a:font script="Tibt" typeface="Microsoft Himalaya"/>
+        <a:font script="Thaa" typeface="MV Boli"/>
+        <a:font script="Deva" typeface="Mangal"/>
+        <a:font script="Telu" typeface="Gautami"/>
+        <a:font script="Taml" typeface="Latha"/>
+        <a:font script="Syrc" typeface="Estrangelo Edessa"/>
+        <a:font script="Orya" typeface="Kalinga"/>
+        <a:font script="Mlym" typeface="Kartika"/>
+        <a:font script="Laoo" typeface="DokChampa"/>
+        <a:font script="Sinh" typeface="Iskoola Pota"/>
+        <a:font script="Mong" typeface="Mongolian Baiti"/>
+        <a:font script="Viet" typeface="Times New Roman"/>
+        <a:font script="Uigh" typeface="Microsoft Uighur"/>
+        <a:font script="Geor" typeface="Sylfaen"/>
+        <a:font script="Armn" typeface="Arial"/>
+        <a:font script="Bugi" typeface="Leelawadee UI"/>
+        <a:font script="Bopo" typeface="Microsoft JhengHei"/>
+        <a:font script="Java" typeface="Javanese Text"/>
+        <a:font script="Lisu" typeface="Segoe UI"/>
+        <a:font script="Mymr" typeface="Myanmar Text"/>
+        <a:font script="Nkoo" typeface="Ebrima"/>
+        <a:font script="Olck" typeface="Nirmala UI"/>
+        <a:font script="Osma" typeface="Ebrima"/>
+        <a:font script="Phag" typeface="Phagspa"/>
+        <a:font script="Syrn" typeface="Estrangelo Edessa"/>
+        <a:font script="Syrj" typeface="Estrangelo Edessa"/>
+        <a:font script="Syre" typeface="Estrangelo Edessa"/>
+        <a:font script="Sora" typeface="Nirmala UI"/>
+        <a:font script="Tale" typeface="Microsoft Tai Le"/>
+        <a:font script="Talu" typeface="Microsoft New Tai Lue"/>
+        <a:font script="Tfng" typeface="Ebrima"/>
+      </a:majorFont>
+      <a:minorFont>
+        <a:latin typeface="Calibri" panose="020F0502020204030204"/>
+        <a:ea typeface=""/>
+        <a:cs typeface=""/>
+        <a:font script="Jpan" typeface="游ゴシック"/>
+        <a:font script="Hang" typeface="맑은 고딕"/>
+        <a:font script="Hans" typeface="等线"/>
+        <a:font script="Hant" typeface="新細明體"/>
+        <a:font script="Arab" typeface="Arial"/>
+        <a:font script="Hebr" typeface="Arial"/>
+        <a:font script="Thai" typeface="Cordia New"/>
+        <a:font script="Ethi" typeface="Nyala"/>
+        <a:font script="Beng" typeface="Vrinda"/>
+        <a:font script="Gujr" typeface="Shruti"/>
+        <a:font script="Khmr" typeface="DaunPenh"/>
+        <a:font script="Knda" typeface="Tunga"/>
+        <a:font script="Guru" typeface="Raavi"/>
+        <a:font script="Cans" typeface="Euphemia"/>
+        <a:font script="Cher" typeface="Plantagenet Cherokee"/>
+        <a:font script="Yiii" typeface="Microsoft Yi Baiti"/>
+        <a:font script="Tibt" typeface="Microsoft Himalaya"/>
+        <a:font script="Thaa" typeface="MV Boli"/>
+        <a:font script="Deva" typeface="Mangal"/>
+        <a:font script="Telu" typeface="Gautami"/>
+        <a:font script="Taml" typeface="Latha"/>
+        <a:font script="Syrc" typeface="Estrangelo Edessa"/>
+        <a:font script="Orya" typeface="Kalinga"/>
+        <a:font script="Mlym" typeface="Kartika"/>
+        <a:font script="Laoo" typeface="DokChampa"/>
+        <a:font script="Sinh" typeface="Iskoola Pota"/>
+        <a:font script="Mong" typeface="Mongolian Baiti"/>
+        <a:font script="Viet" typeface="Arial"/>
+        <a:font script="Uigh" typeface="Microsoft Uighur"/>
+        <a:font script="Geor" typeface="Sylfaen"/>
+        <a:font script="Armn" typeface="Arial"/>
+        <a:font script="Bugi" typeface="Leelawadee UI"/>
+        <a:font script="Bopo" typeface="Microsoft JhengHei"/>
+        <a:font script="Java" typeface="Javanese Text"/>
+        <a:font script="Lisu" typeface="Segoe UI"/>
+        <a:font script="Mymr" typeface="Myanmar Text"/>
+        <a:font script="Nkoo" typeface="Ebrima"/>
+        <a:font script="Olck" typeface="Nirmala UI"/>
+        <a:font script="Osma" typeface="Ebrima"/>
+        <a:font script="Phag" typeface="Phagspa"/>
+        <a:font script="Syrn" typeface="Estrangelo Edessa"/>
+        <a:font script="Syrj" typeface="Estrangelo Edessa"/>
+        <a:font script="Syre" typeface="Estrangelo Edessa"/>
+        <a:font script="Sora" typeface="Nirmala UI"/>
+        <a:font script="Tale" typeface="Microsoft Tai Le"/>
+        <a:font script="Talu" typeface="Microsoft New Tai Lue"/>
+        <a:font script="Tfng" typeface="Ebrima"/>
+      </a:minorFont>
+    </a:fontScheme>
+    <a:fmtScheme name="Office">
+      <a:fillStyleLst>
+        <a:solidFill>
+          <a:schemeClr val="phClr"/>
+        </a:solidFill>
+        <a:gradFill rotWithShape="1">
+          <a:gsLst>
+            <a:gs pos="0">
+              <a:schemeClr val="phClr">
+                <a:lumMod val="110000"/>
+                <a:satMod val="105000"/>
+                <a:tint val="67000"/>
+              </a:schemeClr>
+            </a:gs>
+            <a:gs pos="50000">
+              <a:schemeClr val="phClr">
+                <a:lumMod val="105000"/>
+                <a:satMod val="103000"/>
+                <a:tint val="73000"/>
+              </a:schemeClr>
+            </a:gs>
+            <a:gs pos="100000">
+              <a:schemeClr val="phClr">
+                <a:lumMod val="105000"/>
+                <a:satMod val="109000"/>
+                <a:tint val="81000"/>
+              </a:schemeClr>
+            </a:gs>
+          </a:gsLst>
+          <a:lin ang="5400000" scaled="0"/>
+        </a:gradFill>
+        <a:gradFill rotWithShape="1">
+          <a:gsLst>
+            <a:gs pos="0">
+              <a:schemeClr val="phClr">
+                <a:satMod val="103000"/>
+                <a:lumMod val="102000"/>
+                <a:tint val="94000"/>
+              </a:schemeClr>
+            </a:gs>
+            <a:gs pos="50000">
+              <a:schemeClr val="phClr">
+                <a:satMod val="110000"/>
+                <a:lumMod val="100000"/>
+                <a:shade val="100000"/>
+              </a:schemeClr>
+            </a:gs>
+            <a:gs pos="100000">
+              <a:schemeClr val="phClr">
+                <a:lumMod val="99000"/>
+                <a:satMod val="120000"/>
+                <a:shade val="78000"/>
+              </a:schemeClr>
+            </a:gs>
+          </a:gsLst>
+          <a:lin ang="5400000" scaled="0"/>
+        </a:gradFill>
+      </a:fillStyleLst>
+      <a:lnStyleLst>
+        <a:ln w="6350" cap="flat" cmpd="sng" algn="ctr">
+          <a:solidFill>
+            <a:schemeClr val="phClr"/>
+          </a:solidFill>
+          <a:prstDash val="solid"/>
+          <a:miter lim="800000"/>
+        </a:ln>
+        <a:ln w="12700" cap="flat" cmpd="sng" algn="ctr">
+          <a:solidFill>
+            <a:schemeClr val="phClr"/>
+          </a:solidFill>
+          <a:prstDash val="solid"/>
+          <a:miter lim="800000"/>
+        </a:ln>
+        <a:ln w="19050" cap="flat" cmpd="sng" algn="ctr">
+          <a:solidFill>
+            <a:schemeClr val="phClr"/>
+          </a:solidFill>
+          <a:prstDash val="solid"/>
+          <a:miter lim="800000"/>
+        </a:ln>
+      </a:lnStyleLst>
+      <a:effectStyleLst>
+        <a:effectStyle>
+          <a:effectLst/>
+        </a:effectStyle>
+        <a:effectStyle>
+          <a:effectLst/>
+        </a:effectStyle>
+        <a:effectStyle>
+          <a:effectLst>
+            <a:outerShdw blurRad="57150" dist="19050" dir="5400000" algn="ctr" rotWithShape="0">
+              <a:srgbClr val="000000">
+                <a:alpha val="63000"/>
+              </a:srgbClr>
+            </a:outerShdw>
+          </a:effectLst>
+        </a:effectStyle>
+      </a:effectStyleLst>
+      <a:bgFillStyleLst>
+        <a:solidFill>
+          <a:schemeClr val="phClr"/>
+        </a:solidFill>
+        <a:solidFill>
+          <a:schemeClr val="phClr">
+            <a:tint val="95000"/>
+            <a:satMod val="170000"/>
+          </a:schemeClr>
+        </a:solidFill>
+        <a:gradFill rotWithShape="1">
+          <a:gsLst>
+            <a:gs pos="0">
+              <a:schemeClr val="phClr">
+                <a:tint val="93000"/>
+                <a:satMod val="150000"/>
+                <a:shade val="98000"/>
+                <a:lumMod val="102000"/>
+              </a:schemeClr>
+            </a:gs>
+            <a:gs pos="50000">
+              <a:schemeClr val="phClr">
+                <a:tint val="98000"/>
+                <a:satMod val="130000"/>
+                <a:shade val="90000"/>
+                <a:lumMod val="103000"/>
+              </a:schemeClr>
+            </a:gs>
+            <a:gs pos="100000">
+              <a:schemeClr val="phClr">
+                <a:shade val="63000"/>
+                <a:satMod val="120000"/>
+              </a:schemeClr>
+            </a:gs>
+          </a:gsLst>
+          <a:lin ang="5400000" scaled="0"/>
+        </a:gradFill>
+      </a:bgFillStyleLst>
+    </a:fmtScheme>
+  </a:themeElements>
+  <a:objectDefaults/>
+  <a:extraClrSchemeLst/>
+  <a:extLst>
+    <a:ext uri="{05A4C25C-085E-4340-85A3-A5531E510DB2}">
+      <thm15:themeFamily xmlns:thm15="http://schemas.microsoft.com/office/thememl/2012/main" name="Office Theme" id="{62F939B6-93AF-4DB8-9C6B-D6C7DFDC589F}" vid="{4A3C46E8-61CC-4603-A589-7422A47A8E4A}"/>
+    </a:ext>
+  </a:extLst>
+</a:theme>
 </file>
</xml_diff>